<commit_message>
updated day 1, 2 files
</commit_message>
<xml_diff>
--- a/Day_1/Lectures/Day_1_Lecture_1_Introduction_to_Artificial_Intelligence_and_Machine_Learning.pptx
+++ b/Day_1/Lectures/Day_1_Lecture_1_Introduction_to_Artificial_Intelligence_and_Machine_Learning.pptx
@@ -27762,9 +27762,9 @@
 </file>
 
 <file path=ppt/theme/theme1.xml><?xml version="1.0" encoding="utf-8"?>
-<a:theme xmlns:a="http://schemas.openxmlformats.org/drawingml/2006/main" xmlns:r="http://schemas.openxmlformats.org/officeDocument/2006/relationships">
+<a:theme xmlns:a="http://schemas.openxmlformats.org/drawingml/2006/main" xmlns:r="http://schemas.openxmlformats.org/officeDocument/2006/relationships" name="Simple Light">
   <a:themeElements>
-    <a:clrScheme name="Default">
+    <a:clrScheme name="Simple Light">
       <a:dk1>
         <a:srgbClr val="000000"/>
       </a:dk1>
@@ -27772,34 +27772,34 @@
         <a:srgbClr val="FFFFFF"/>
       </a:lt1>
       <a:dk2>
-        <a:srgbClr val="158158"/>
+        <a:srgbClr val="595959"/>
       </a:dk2>
       <a:lt2>
-        <a:srgbClr val="F3F3F3"/>
+        <a:srgbClr val="EEEEEE"/>
       </a:lt2>
       <a:accent1>
-        <a:srgbClr val="058DC7"/>
+        <a:srgbClr val="4285F4"/>
       </a:accent1>
       <a:accent2>
-        <a:srgbClr val="50B432"/>
+        <a:srgbClr val="212121"/>
       </a:accent2>
       <a:accent3>
-        <a:srgbClr val="ED561B"/>
+        <a:srgbClr val="78909C"/>
       </a:accent3>
       <a:accent4>
-        <a:srgbClr val="EDEF00"/>
+        <a:srgbClr val="FFAB40"/>
       </a:accent4>
       <a:accent5>
-        <a:srgbClr val="24CBE5"/>
+        <a:srgbClr val="0097A7"/>
       </a:accent5>
       <a:accent6>
-        <a:srgbClr val="64E572"/>
+        <a:srgbClr val="EEFF41"/>
       </a:accent6>
       <a:hlink>
-        <a:srgbClr val="2200CC"/>
+        <a:srgbClr val="0097A7"/>
       </a:hlink>
       <a:folHlink>
-        <a:srgbClr val="551A8B"/>
+        <a:srgbClr val="0097A7"/>
       </a:folHlink>
     </a:clrScheme>
     <a:fontScheme name="Office">
@@ -28320,9 +28320,9 @@
 </file>
 
 <file path=ppt/theme/theme3.xml><?xml version="1.0" encoding="utf-8"?>
-<a:theme xmlns:a="http://schemas.openxmlformats.org/drawingml/2006/main" xmlns:r="http://schemas.openxmlformats.org/officeDocument/2006/relationships" name="Simple Light">
+<a:theme xmlns:a="http://schemas.openxmlformats.org/drawingml/2006/main" xmlns:r="http://schemas.openxmlformats.org/officeDocument/2006/relationships">
   <a:themeElements>
-    <a:clrScheme name="Simple Light">
+    <a:clrScheme name="Default">
       <a:dk1>
         <a:srgbClr val="000000"/>
       </a:dk1>
@@ -28330,34 +28330,34 @@
         <a:srgbClr val="FFFFFF"/>
       </a:lt1>
       <a:dk2>
-        <a:srgbClr val="595959"/>
+        <a:srgbClr val="158158"/>
       </a:dk2>
       <a:lt2>
-        <a:srgbClr val="EEEEEE"/>
+        <a:srgbClr val="F3F3F3"/>
       </a:lt2>
       <a:accent1>
-        <a:srgbClr val="4285F4"/>
+        <a:srgbClr val="058DC7"/>
       </a:accent1>
       <a:accent2>
-        <a:srgbClr val="212121"/>
+        <a:srgbClr val="50B432"/>
       </a:accent2>
       <a:accent3>
-        <a:srgbClr val="78909C"/>
+        <a:srgbClr val="ED561B"/>
       </a:accent3>
       <a:accent4>
-        <a:srgbClr val="FFAB40"/>
+        <a:srgbClr val="EDEF00"/>
       </a:accent4>
       <a:accent5>
-        <a:srgbClr val="0097A7"/>
+        <a:srgbClr val="24CBE5"/>
       </a:accent5>
       <a:accent6>
-        <a:srgbClr val="EEFF41"/>
+        <a:srgbClr val="64E572"/>
       </a:accent6>
       <a:hlink>
-        <a:srgbClr val="0097A7"/>
+        <a:srgbClr val="2200CC"/>
       </a:hlink>
       <a:folHlink>
-        <a:srgbClr val="0097A7"/>
+        <a:srgbClr val="551A8B"/>
       </a:folHlink>
     </a:clrScheme>
     <a:fontScheme name="Office">

</xml_diff>

<commit_message>
update Day Live Demo 4
</commit_message>
<xml_diff>
--- a/Day_1/Lectures/Day_1_Lecture_1_Introduction_to_Artificial_Intelligence_and_Machine_Learning.pptx
+++ b/Day_1/Lectures/Day_1_Lecture_1_Introduction_to_Artificial_Intelligence_and_Machine_Learning.pptx
@@ -4613,7 +4613,7 @@
   <p:cSld>
     <p:spTree>
       <p:nvGrpSpPr>
-        <p:cNvPr id="423" name="Shape 423"/>
+        <p:cNvPr id="424" name="Shape 424"/>
         <p:cNvGrpSpPr/>
         <p:nvPr/>
       </p:nvGrpSpPr>
@@ -4627,7 +4627,7 @@
       </p:grpSpPr>
       <p:sp>
         <p:nvSpPr>
-          <p:cNvPr id="424" name="Google Shape;424;gf3db6bae83_0_42:notes"/>
+          <p:cNvPr id="425" name="Google Shape;425;gf3db6bae83_0_42:notes"/>
           <p:cNvSpPr/>
           <p:nvPr>
             <p:ph idx="2" type="sldImg"/>
@@ -4662,7 +4662,7 @@
       </p:sp>
       <p:sp>
         <p:nvSpPr>
-          <p:cNvPr id="425" name="Google Shape;425;gf3db6bae83_0_42:notes"/>
+          <p:cNvPr id="426" name="Google Shape;426;gf3db6bae83_0_42:notes"/>
           <p:cNvSpPr txBox="1"/>
           <p:nvPr>
             <p:ph idx="1" type="body"/>
@@ -4712,7 +4712,7 @@
   <p:cSld>
     <p:spTree>
       <p:nvGrpSpPr>
-        <p:cNvPr id="442" name="Shape 442"/>
+        <p:cNvPr id="443" name="Shape 443"/>
         <p:cNvGrpSpPr/>
         <p:nvPr/>
       </p:nvGrpSpPr>
@@ -4726,7 +4726,7 @@
       </p:grpSpPr>
       <p:sp>
         <p:nvSpPr>
-          <p:cNvPr id="443" name="Google Shape;443;g110cd4518f6_0_0:notes"/>
+          <p:cNvPr id="444" name="Google Shape;444;g110cd4518f6_0_0:notes"/>
           <p:cNvSpPr/>
           <p:nvPr>
             <p:ph idx="2" type="sldImg"/>
@@ -4761,7 +4761,7 @@
       </p:sp>
       <p:sp>
         <p:nvSpPr>
-          <p:cNvPr id="444" name="Google Shape;444;g110cd4518f6_0_0:notes"/>
+          <p:cNvPr id="445" name="Google Shape;445;g110cd4518f6_0_0:notes"/>
           <p:cNvSpPr txBox="1"/>
           <p:nvPr>
             <p:ph idx="1" type="body"/>
@@ -25372,6 +25372,58 @@
           </a:p>
         </p:txBody>
       </p:sp>
+      <p:sp>
+        <p:nvSpPr>
+          <p:cNvPr id="423" name="Google Shape;423;p51"/>
+          <p:cNvSpPr txBox="1"/>
+          <p:nvPr/>
+        </p:nvSpPr>
+        <p:spPr>
+          <a:xfrm>
+            <a:off x="185975" y="4757550"/>
+            <a:ext cx="2537100" cy="338700"/>
+          </a:xfrm>
+          <a:prstGeom prst="rect">
+            <a:avLst/>
+          </a:prstGeom>
+          <a:noFill/>
+          <a:ln>
+            <a:noFill/>
+          </a:ln>
+        </p:spPr>
+        <p:txBody>
+          <a:bodyPr anchorCtr="0" anchor="t" bIns="91425" lIns="91425" spcFirstLastPara="1" rIns="91425" wrap="square" tIns="91425">
+            <a:spAutoFit/>
+          </a:bodyPr>
+          <a:lstStyle/>
+          <a:p>
+            <a:pPr indent="0" lvl="0" marL="0" rtl="0" algn="r">
+              <a:spcBef>
+                <a:spcPts val="0"/>
+              </a:spcBef>
+              <a:spcAft>
+                <a:spcPts val="0"/>
+              </a:spcAft>
+              <a:buNone/>
+            </a:pPr>
+            <a:r>
+              <a:rPr i="1" lang="en" sz="1000">
+                <a:latin typeface="Roboto"/>
+                <a:ea typeface="Roboto"/>
+                <a:cs typeface="Roboto"/>
+                <a:sym typeface="Roboto"/>
+              </a:rPr>
+              <a:t>Created in Lucidchart  by C. Arighi</a:t>
+            </a:r>
+            <a:endParaRPr i="1" sz="1000">
+              <a:latin typeface="Roboto"/>
+              <a:ea typeface="Roboto"/>
+              <a:cs typeface="Roboto"/>
+              <a:sym typeface="Roboto"/>
+            </a:endParaRPr>
+          </a:p>
+        </p:txBody>
+      </p:sp>
     </p:spTree>
   </p:cSld>
   <p:clrMapOvr>
@@ -25802,7 +25854,7 @@
   <p:cSld>
     <p:spTree>
       <p:nvGrpSpPr>
-        <p:cNvPr id="426" name="Shape 426"/>
+        <p:cNvPr id="427" name="Shape 427"/>
         <p:cNvGrpSpPr/>
         <p:nvPr/>
       </p:nvGrpSpPr>
@@ -25816,7 +25868,7 @@
       </p:grpSpPr>
       <p:pic>
         <p:nvPicPr>
-          <p:cNvPr id="427" name="Google Shape;427;p52"/>
+          <p:cNvPr id="428" name="Google Shape;428;p52"/>
           <p:cNvPicPr preferRelativeResize="0"/>
           <p:nvPr/>
         </p:nvPicPr>
@@ -25844,7 +25896,7 @@
       </p:pic>
       <p:sp>
         <p:nvSpPr>
-          <p:cNvPr id="428" name="Google Shape;428;p52"/>
+          <p:cNvPr id="429" name="Google Shape;429;p52"/>
           <p:cNvSpPr txBox="1"/>
           <p:nvPr>
             <p:ph type="title"/>
@@ -25892,7 +25944,7 @@
       </p:sp>
       <p:sp>
         <p:nvSpPr>
-          <p:cNvPr id="429" name="Google Shape;429;p52"/>
+          <p:cNvPr id="430" name="Google Shape;430;p52"/>
           <p:cNvSpPr txBox="1"/>
           <p:nvPr>
             <p:ph idx="12" type="sldNum"/>
@@ -25948,7 +26000,7 @@
       </p:sp>
       <p:sp>
         <p:nvSpPr>
-          <p:cNvPr id="430" name="Google Shape;430;p52"/>
+          <p:cNvPr id="431" name="Google Shape;431;p52"/>
           <p:cNvSpPr txBox="1"/>
           <p:nvPr/>
         </p:nvSpPr>
@@ -26033,47 +26085,6 @@
               <a:cs typeface="Roboto"/>
               <a:sym typeface="Roboto"/>
             </a:endParaRPr>
-          </a:p>
-        </p:txBody>
-      </p:sp>
-      <p:sp>
-        <p:nvSpPr>
-          <p:cNvPr id="431" name="Google Shape;431;p52"/>
-          <p:cNvSpPr txBox="1"/>
-          <p:nvPr/>
-        </p:nvSpPr>
-        <p:spPr>
-          <a:xfrm>
-            <a:off x="661900" y="1378950"/>
-            <a:ext cx="7143000" cy="400200"/>
-          </a:xfrm>
-          <a:prstGeom prst="rect">
-            <a:avLst/>
-          </a:prstGeom>
-          <a:noFill/>
-          <a:ln>
-            <a:noFill/>
-          </a:ln>
-        </p:spPr>
-        <p:txBody>
-          <a:bodyPr anchorCtr="0" anchor="t" bIns="91425" lIns="91425" spcFirstLastPara="1" rIns="91425" wrap="square" tIns="91425">
-            <a:spAutoFit/>
-          </a:bodyPr>
-          <a:lstStyle/>
-          <a:p>
-            <a:pPr indent="0" lvl="0" marL="0" rtl="0" algn="l">
-              <a:spcBef>
-                <a:spcPts val="0"/>
-              </a:spcBef>
-              <a:spcAft>
-                <a:spcPts val="0"/>
-              </a:spcAft>
-              <a:buNone/>
-            </a:pPr>
-            <a:r>
-              <a:t/>
-            </a:r>
-            <a:endParaRPr/>
           </a:p>
         </p:txBody>
       </p:sp>
@@ -26085,8 +26096,8 @@
         </p:nvSpPr>
         <p:spPr>
           <a:xfrm>
-            <a:off x="548700" y="900500"/>
-            <a:ext cx="7694700" cy="1046700"/>
+            <a:off x="661900" y="1378950"/>
+            <a:ext cx="7143000" cy="400200"/>
           </a:xfrm>
           <a:prstGeom prst="rect">
             <a:avLst/>
@@ -26102,70 +26113,17 @@
           </a:bodyPr>
           <a:lstStyle/>
           <a:p>
-            <a:pPr indent="-317500" lvl="0" marL="457200" rtl="0" algn="l">
-              <a:spcBef>
-                <a:spcPts val="0"/>
-              </a:spcBef>
-              <a:spcAft>
-                <a:spcPts val="0"/>
-              </a:spcAft>
-              <a:buSzPts val="1400"/>
-              <a:buChar char="❏"/>
-            </a:pPr>
-            <a:r>
-              <a:rPr lang="en"/>
-              <a:t>Neuroscience</a:t>
-            </a:r>
-            <a:endParaRPr/>
-          </a:p>
-          <a:p>
-            <a:pPr indent="-317500" lvl="0" marL="457200" rtl="0" algn="l">
-              <a:spcBef>
-                <a:spcPts val="0"/>
-              </a:spcBef>
-              <a:spcAft>
-                <a:spcPts val="0"/>
-              </a:spcAft>
-              <a:buSzPts val="1400"/>
-              <a:buChar char="❏"/>
-            </a:pPr>
-            <a:r>
-              <a:rPr lang="en"/>
-              <a:t>Mathematics</a:t>
-            </a:r>
-            <a:endParaRPr/>
-          </a:p>
-          <a:p>
-            <a:pPr indent="-317500" lvl="0" marL="457200" rtl="0" algn="l">
-              <a:spcBef>
-                <a:spcPts val="0"/>
-              </a:spcBef>
-              <a:spcAft>
-                <a:spcPts val="0"/>
-              </a:spcAft>
-              <a:buSzPts val="1400"/>
-              <a:buChar char="❏"/>
-            </a:pPr>
-            <a:r>
-              <a:rPr lang="en"/>
-              <a:t>Data Science</a:t>
-            </a:r>
-            <a:endParaRPr/>
-          </a:p>
-          <a:p>
-            <a:pPr indent="-317500" lvl="0" marL="457200" rtl="0" algn="l">
-              <a:spcBef>
-                <a:spcPts val="0"/>
-              </a:spcBef>
-              <a:spcAft>
-                <a:spcPts val="0"/>
-              </a:spcAft>
-              <a:buSzPts val="1400"/>
-              <a:buChar char="❏"/>
-            </a:pPr>
-            <a:r>
-              <a:rPr lang="en"/>
-              <a:t>Computer Science</a:t>
+            <a:pPr indent="0" lvl="0" marL="0" rtl="0" algn="l">
+              <a:spcBef>
+                <a:spcPts val="0"/>
+              </a:spcBef>
+              <a:spcAft>
+                <a:spcPts val="0"/>
+              </a:spcAft>
+              <a:buNone/>
+            </a:pPr>
+            <a:r>
+              <a:t/>
             </a:r>
             <a:endParaRPr/>
           </a:p>
@@ -26179,8 +26137,8 @@
         </p:nvSpPr>
         <p:spPr>
           <a:xfrm>
-            <a:off x="405900" y="1821625"/>
-            <a:ext cx="8332200" cy="461700"/>
+            <a:off x="548700" y="900500"/>
+            <a:ext cx="7694700" cy="1046700"/>
           </a:xfrm>
           <a:prstGeom prst="rect">
             <a:avLst/>
@@ -26196,59 +26154,72 @@
           </a:bodyPr>
           <a:lstStyle/>
           <a:p>
-            <a:pPr indent="-342900" lvl="0" marL="457200" rtl="0" algn="l">
-              <a:spcBef>
-                <a:spcPts val="0"/>
-              </a:spcBef>
-              <a:spcAft>
-                <a:spcPts val="0"/>
-              </a:spcAft>
-              <a:buSzPts val="1800"/>
-              <a:buFont typeface="Roboto"/>
-              <a:buChar char="●"/>
-            </a:pPr>
-            <a:r>
-              <a:rPr lang="en" sz="1800">
-                <a:latin typeface="Roboto"/>
-                <a:ea typeface="Roboto"/>
-                <a:cs typeface="Roboto"/>
-                <a:sym typeface="Roboto"/>
-              </a:rPr>
-              <a:t>What are the </a:t>
-            </a:r>
-            <a:r>
-              <a:rPr lang="en" sz="1800">
-                <a:latin typeface="Roboto"/>
-                <a:ea typeface="Roboto"/>
-                <a:cs typeface="Roboto"/>
-                <a:sym typeface="Roboto"/>
-              </a:rPr>
-              <a:t>characteristics</a:t>
-            </a:r>
-            <a:r>
-              <a:rPr lang="en" sz="1800">
-                <a:latin typeface="Roboto"/>
-                <a:ea typeface="Roboto"/>
-                <a:cs typeface="Roboto"/>
-                <a:sym typeface="Roboto"/>
-              </a:rPr>
-              <a:t> of </a:t>
-            </a:r>
-            <a:r>
-              <a:rPr lang="en" sz="1800">
-                <a:latin typeface="Roboto"/>
-                <a:ea typeface="Roboto"/>
-                <a:cs typeface="Roboto"/>
-                <a:sym typeface="Roboto"/>
-              </a:rPr>
-              <a:t>Machine Learning algorithms?</a:t>
-            </a:r>
-            <a:endParaRPr sz="1800">
-              <a:latin typeface="Roboto"/>
-              <a:ea typeface="Roboto"/>
-              <a:cs typeface="Roboto"/>
-              <a:sym typeface="Roboto"/>
-            </a:endParaRPr>
+            <a:pPr indent="-317500" lvl="0" marL="457200" rtl="0" algn="l">
+              <a:spcBef>
+                <a:spcPts val="0"/>
+              </a:spcBef>
+              <a:spcAft>
+                <a:spcPts val="0"/>
+              </a:spcAft>
+              <a:buSzPts val="1400"/>
+              <a:buChar char="❏"/>
+            </a:pPr>
+            <a:r>
+              <a:rPr lang="en"/>
+              <a:t>Neuroscience</a:t>
+            </a:r>
+            <a:endParaRPr/>
+          </a:p>
+          <a:p>
+            <a:pPr indent="-317500" lvl="0" marL="457200" rtl="0" algn="l">
+              <a:spcBef>
+                <a:spcPts val="0"/>
+              </a:spcBef>
+              <a:spcAft>
+                <a:spcPts val="0"/>
+              </a:spcAft>
+              <a:buSzPts val="1400"/>
+              <a:buChar char="❏"/>
+            </a:pPr>
+            <a:r>
+              <a:rPr lang="en"/>
+              <a:t>Mathematics</a:t>
+            </a:r>
+            <a:endParaRPr/>
+          </a:p>
+          <a:p>
+            <a:pPr indent="-317500" lvl="0" marL="457200" rtl="0" algn="l">
+              <a:spcBef>
+                <a:spcPts val="0"/>
+              </a:spcBef>
+              <a:spcAft>
+                <a:spcPts val="0"/>
+              </a:spcAft>
+              <a:buSzPts val="1400"/>
+              <a:buChar char="❏"/>
+            </a:pPr>
+            <a:r>
+              <a:rPr lang="en"/>
+              <a:t>Data Science</a:t>
+            </a:r>
+            <a:endParaRPr/>
+          </a:p>
+          <a:p>
+            <a:pPr indent="-317500" lvl="0" marL="457200" rtl="0" algn="l">
+              <a:spcBef>
+                <a:spcPts val="0"/>
+              </a:spcBef>
+              <a:spcAft>
+                <a:spcPts val="0"/>
+              </a:spcAft>
+              <a:buSzPts val="1400"/>
+              <a:buChar char="❏"/>
+            </a:pPr>
+            <a:r>
+              <a:rPr lang="en"/>
+              <a:t>Computer Science</a:t>
+            </a:r>
+            <a:endParaRPr/>
           </a:p>
         </p:txBody>
       </p:sp>
@@ -26260,8 +26231,8 @@
         </p:nvSpPr>
         <p:spPr>
           <a:xfrm>
-            <a:off x="548700" y="2199288"/>
-            <a:ext cx="7694700" cy="1046700"/>
+            <a:off x="405900" y="1821625"/>
+            <a:ext cx="8332200" cy="461700"/>
           </a:xfrm>
           <a:prstGeom prst="rect">
             <a:avLst/>
@@ -26277,72 +26248,59 @@
           </a:bodyPr>
           <a:lstStyle/>
           <a:p>
-            <a:pPr indent="-317500" lvl="0" marL="457200" rtl="0" algn="l">
-              <a:spcBef>
-                <a:spcPts val="0"/>
-              </a:spcBef>
-              <a:spcAft>
-                <a:spcPts val="0"/>
-              </a:spcAft>
-              <a:buSzPts val="1400"/>
-              <a:buChar char="❏"/>
-            </a:pPr>
-            <a:r>
-              <a:rPr lang="en"/>
-              <a:t>Performing some task</a:t>
-            </a:r>
-            <a:endParaRPr/>
-          </a:p>
-          <a:p>
-            <a:pPr indent="-317500" lvl="0" marL="457200" rtl="0" algn="l">
-              <a:spcBef>
-                <a:spcPts val="0"/>
-              </a:spcBef>
-              <a:spcAft>
-                <a:spcPts val="0"/>
-              </a:spcAft>
-              <a:buSzPts val="1400"/>
-              <a:buChar char="❏"/>
-            </a:pPr>
-            <a:r>
-              <a:rPr lang="en"/>
-              <a:t>Gain experience over time</a:t>
-            </a:r>
-            <a:endParaRPr/>
-          </a:p>
-          <a:p>
-            <a:pPr indent="-317500" lvl="0" marL="457200" rtl="0" algn="l">
-              <a:spcBef>
-                <a:spcPts val="0"/>
-              </a:spcBef>
-              <a:spcAft>
-                <a:spcPts val="0"/>
-              </a:spcAft>
-              <a:buSzPts val="1400"/>
-              <a:buChar char="❏"/>
-            </a:pPr>
-            <a:r>
-              <a:rPr lang="en"/>
-              <a:t>Improve their performance</a:t>
-            </a:r>
-            <a:endParaRPr/>
-          </a:p>
-          <a:p>
-            <a:pPr indent="-317500" lvl="0" marL="457200" rtl="0" algn="l">
-              <a:spcBef>
-                <a:spcPts val="0"/>
-              </a:spcBef>
-              <a:spcAft>
-                <a:spcPts val="0"/>
-              </a:spcAft>
-              <a:buSzPts val="1400"/>
-              <a:buChar char="❏"/>
-            </a:pPr>
-            <a:r>
-              <a:rPr lang="en"/>
-              <a:t>All of the above</a:t>
-            </a:r>
-            <a:endParaRPr/>
+            <a:pPr indent="-342900" lvl="0" marL="457200" rtl="0" algn="l">
+              <a:spcBef>
+                <a:spcPts val="0"/>
+              </a:spcBef>
+              <a:spcAft>
+                <a:spcPts val="0"/>
+              </a:spcAft>
+              <a:buSzPts val="1800"/>
+              <a:buFont typeface="Roboto"/>
+              <a:buChar char="●"/>
+            </a:pPr>
+            <a:r>
+              <a:rPr lang="en" sz="1800">
+                <a:latin typeface="Roboto"/>
+                <a:ea typeface="Roboto"/>
+                <a:cs typeface="Roboto"/>
+                <a:sym typeface="Roboto"/>
+              </a:rPr>
+              <a:t>What are the </a:t>
+            </a:r>
+            <a:r>
+              <a:rPr lang="en" sz="1800">
+                <a:latin typeface="Roboto"/>
+                <a:ea typeface="Roboto"/>
+                <a:cs typeface="Roboto"/>
+                <a:sym typeface="Roboto"/>
+              </a:rPr>
+              <a:t>characteristics</a:t>
+            </a:r>
+            <a:r>
+              <a:rPr lang="en" sz="1800">
+                <a:latin typeface="Roboto"/>
+                <a:ea typeface="Roboto"/>
+                <a:cs typeface="Roboto"/>
+                <a:sym typeface="Roboto"/>
+              </a:rPr>
+              <a:t> of </a:t>
+            </a:r>
+            <a:r>
+              <a:rPr lang="en" sz="1800">
+                <a:latin typeface="Roboto"/>
+                <a:ea typeface="Roboto"/>
+                <a:cs typeface="Roboto"/>
+                <a:sym typeface="Roboto"/>
+              </a:rPr>
+              <a:t>Machine Learning algorithms?</a:t>
+            </a:r>
+            <a:endParaRPr sz="1800">
+              <a:latin typeface="Roboto"/>
+              <a:ea typeface="Roboto"/>
+              <a:cs typeface="Roboto"/>
+              <a:sym typeface="Roboto"/>
+            </a:endParaRPr>
           </a:p>
         </p:txBody>
       </p:sp>
@@ -26354,8 +26312,8 @@
         </p:nvSpPr>
         <p:spPr>
           <a:xfrm>
-            <a:off x="405900" y="3197013"/>
-            <a:ext cx="8332200" cy="461700"/>
+            <a:off x="548700" y="2199288"/>
+            <a:ext cx="7694700" cy="1046700"/>
           </a:xfrm>
           <a:prstGeom prst="rect">
             <a:avLst/>
@@ -26371,50 +26329,72 @@
           </a:bodyPr>
           <a:lstStyle/>
           <a:p>
-            <a:pPr indent="-342900" lvl="0" marL="457200" rtl="0" algn="l">
-              <a:spcBef>
-                <a:spcPts val="0"/>
-              </a:spcBef>
-              <a:spcAft>
-                <a:spcPts val="0"/>
-              </a:spcAft>
-              <a:buSzPts val="1800"/>
-              <a:buFont typeface="Roboto"/>
-              <a:buChar char="●"/>
-            </a:pPr>
-            <a:r>
-              <a:rPr lang="en" sz="1800">
-                <a:latin typeface="Roboto"/>
-                <a:ea typeface="Roboto"/>
-                <a:cs typeface="Roboto"/>
-                <a:sym typeface="Roboto"/>
-              </a:rPr>
-              <a:t>Which</a:t>
-            </a:r>
-            <a:r>
-              <a:rPr lang="en" sz="1800">
-                <a:latin typeface="Roboto"/>
-                <a:ea typeface="Roboto"/>
-                <a:cs typeface="Roboto"/>
-                <a:sym typeface="Roboto"/>
-              </a:rPr>
-              <a:t> of the following is not supervised learning</a:t>
-            </a:r>
-            <a:r>
-              <a:rPr lang="en" sz="1800">
-                <a:latin typeface="Roboto"/>
-                <a:ea typeface="Roboto"/>
-                <a:cs typeface="Roboto"/>
-                <a:sym typeface="Roboto"/>
-              </a:rPr>
-              <a:t>?</a:t>
-            </a:r>
-            <a:endParaRPr sz="1800">
-              <a:latin typeface="Roboto"/>
-              <a:ea typeface="Roboto"/>
-              <a:cs typeface="Roboto"/>
-              <a:sym typeface="Roboto"/>
-            </a:endParaRPr>
+            <a:pPr indent="-317500" lvl="0" marL="457200" rtl="0" algn="l">
+              <a:spcBef>
+                <a:spcPts val="0"/>
+              </a:spcBef>
+              <a:spcAft>
+                <a:spcPts val="0"/>
+              </a:spcAft>
+              <a:buSzPts val="1400"/>
+              <a:buChar char="❏"/>
+            </a:pPr>
+            <a:r>
+              <a:rPr lang="en"/>
+              <a:t>Performing some task</a:t>
+            </a:r>
+            <a:endParaRPr/>
+          </a:p>
+          <a:p>
+            <a:pPr indent="-317500" lvl="0" marL="457200" rtl="0" algn="l">
+              <a:spcBef>
+                <a:spcPts val="0"/>
+              </a:spcBef>
+              <a:spcAft>
+                <a:spcPts val="0"/>
+              </a:spcAft>
+              <a:buSzPts val="1400"/>
+              <a:buChar char="❏"/>
+            </a:pPr>
+            <a:r>
+              <a:rPr lang="en"/>
+              <a:t>Gain experience over time</a:t>
+            </a:r>
+            <a:endParaRPr/>
+          </a:p>
+          <a:p>
+            <a:pPr indent="-317500" lvl="0" marL="457200" rtl="0" algn="l">
+              <a:spcBef>
+                <a:spcPts val="0"/>
+              </a:spcBef>
+              <a:spcAft>
+                <a:spcPts val="0"/>
+              </a:spcAft>
+              <a:buSzPts val="1400"/>
+              <a:buChar char="❏"/>
+            </a:pPr>
+            <a:r>
+              <a:rPr lang="en"/>
+              <a:t>Improve their performance</a:t>
+            </a:r>
+            <a:endParaRPr/>
+          </a:p>
+          <a:p>
+            <a:pPr indent="-317500" lvl="0" marL="457200" rtl="0" algn="l">
+              <a:spcBef>
+                <a:spcPts val="0"/>
+              </a:spcBef>
+              <a:spcAft>
+                <a:spcPts val="0"/>
+              </a:spcAft>
+              <a:buSzPts val="1400"/>
+              <a:buChar char="❏"/>
+            </a:pPr>
+            <a:r>
+              <a:rPr lang="en"/>
+              <a:t>All of the above</a:t>
+            </a:r>
+            <a:endParaRPr/>
           </a:p>
         </p:txBody>
       </p:sp>
@@ -26426,8 +26406,8 @@
         </p:nvSpPr>
         <p:spPr>
           <a:xfrm>
-            <a:off x="548700" y="3545488"/>
-            <a:ext cx="7694700" cy="1046700"/>
+            <a:off x="405900" y="3197013"/>
+            <a:ext cx="8332200" cy="461700"/>
           </a:xfrm>
           <a:prstGeom prst="rect">
             <a:avLst/>
@@ -26443,76 +26423,50 @@
           </a:bodyPr>
           <a:lstStyle/>
           <a:p>
-            <a:pPr indent="-317500" lvl="0" marL="457200" rtl="0" algn="l">
-              <a:spcBef>
-                <a:spcPts val="0"/>
-              </a:spcBef>
-              <a:spcAft>
-                <a:spcPts val="0"/>
-              </a:spcAft>
-              <a:buSzPts val="1400"/>
-              <a:buChar char="❏"/>
-            </a:pPr>
-            <a:r>
-              <a:rPr lang="en"/>
-              <a:t>Linear regression</a:t>
-            </a:r>
-            <a:endParaRPr/>
-          </a:p>
-          <a:p>
-            <a:pPr indent="-317500" lvl="0" marL="457200" rtl="0" algn="l">
-              <a:spcBef>
-                <a:spcPts val="0"/>
-              </a:spcBef>
-              <a:spcAft>
-                <a:spcPts val="0"/>
-              </a:spcAft>
-              <a:buSzPts val="1400"/>
-              <a:buChar char="❏"/>
-            </a:pPr>
-            <a:r>
-              <a:rPr lang="en"/>
-              <a:t>Decision tree</a:t>
-            </a:r>
-            <a:endParaRPr/>
-          </a:p>
-          <a:p>
-            <a:pPr indent="-317500" lvl="0" marL="457200" rtl="0" algn="l">
-              <a:spcBef>
-                <a:spcPts val="0"/>
-              </a:spcBef>
-              <a:spcAft>
-                <a:spcPts val="0"/>
-              </a:spcAft>
-              <a:buSzPts val="1400"/>
-              <a:buChar char="❏"/>
-            </a:pPr>
-            <a:r>
-              <a:rPr lang="en"/>
-              <a:t>Principal</a:t>
-            </a:r>
-            <a:r>
-              <a:rPr lang="en"/>
-              <a:t> Component Analysis</a:t>
-            </a:r>
-            <a:endParaRPr/>
-          </a:p>
-          <a:p>
-            <a:pPr indent="-317500" lvl="0" marL="457200" rtl="0" algn="l">
-              <a:spcBef>
-                <a:spcPts val="0"/>
-              </a:spcBef>
-              <a:spcAft>
-                <a:spcPts val="0"/>
-              </a:spcAft>
-              <a:buSzPts val="1400"/>
-              <a:buChar char="❏"/>
-            </a:pPr>
-            <a:r>
-              <a:rPr lang="en"/>
-              <a:t>Support Vector Machine</a:t>
-            </a:r>
-            <a:endParaRPr/>
+            <a:pPr indent="-342900" lvl="0" marL="457200" rtl="0" algn="l">
+              <a:spcBef>
+                <a:spcPts val="0"/>
+              </a:spcBef>
+              <a:spcAft>
+                <a:spcPts val="0"/>
+              </a:spcAft>
+              <a:buSzPts val="1800"/>
+              <a:buFont typeface="Roboto"/>
+              <a:buChar char="●"/>
+            </a:pPr>
+            <a:r>
+              <a:rPr lang="en" sz="1800">
+                <a:latin typeface="Roboto"/>
+                <a:ea typeface="Roboto"/>
+                <a:cs typeface="Roboto"/>
+                <a:sym typeface="Roboto"/>
+              </a:rPr>
+              <a:t>Which</a:t>
+            </a:r>
+            <a:r>
+              <a:rPr lang="en" sz="1800">
+                <a:latin typeface="Roboto"/>
+                <a:ea typeface="Roboto"/>
+                <a:cs typeface="Roboto"/>
+                <a:sym typeface="Roboto"/>
+              </a:rPr>
+              <a:t> of the following is not supervised learning</a:t>
+            </a:r>
+            <a:r>
+              <a:rPr lang="en" sz="1800">
+                <a:latin typeface="Roboto"/>
+                <a:ea typeface="Roboto"/>
+                <a:cs typeface="Roboto"/>
+                <a:sym typeface="Roboto"/>
+              </a:rPr>
+              <a:t>?</a:t>
+            </a:r>
+            <a:endParaRPr sz="1800">
+              <a:latin typeface="Roboto"/>
+              <a:ea typeface="Roboto"/>
+              <a:cs typeface="Roboto"/>
+              <a:sym typeface="Roboto"/>
+            </a:endParaRPr>
           </a:p>
         </p:txBody>
       </p:sp>
@@ -26524,8 +26478,8 @@
         </p:nvSpPr>
         <p:spPr>
           <a:xfrm>
-            <a:off x="661900" y="840513"/>
-            <a:ext cx="427500" cy="400200"/>
+            <a:off x="548700" y="3545488"/>
+            <a:ext cx="7694700" cy="1046700"/>
           </a:xfrm>
           <a:prstGeom prst="rect">
             <a:avLst/>
@@ -26541,18 +26495,74 @@
           </a:bodyPr>
           <a:lstStyle/>
           <a:p>
-            <a:pPr indent="0" lvl="0" marL="0" rtl="0" algn="l">
-              <a:spcBef>
-                <a:spcPts val="0"/>
-              </a:spcBef>
-              <a:spcAft>
-                <a:spcPts val="0"/>
-              </a:spcAft>
-              <a:buNone/>
+            <a:pPr indent="-317500" lvl="0" marL="457200" rtl="0" algn="l">
+              <a:spcBef>
+                <a:spcPts val="0"/>
+              </a:spcBef>
+              <a:spcAft>
+                <a:spcPts val="0"/>
+              </a:spcAft>
+              <a:buSzPts val="1400"/>
+              <a:buChar char="❏"/>
             </a:pPr>
             <a:r>
               <a:rPr lang="en"/>
-              <a:t>✔</a:t>
+              <a:t>Linear regression</a:t>
+            </a:r>
+            <a:endParaRPr/>
+          </a:p>
+          <a:p>
+            <a:pPr indent="-317500" lvl="0" marL="457200" rtl="0" algn="l">
+              <a:spcBef>
+                <a:spcPts val="0"/>
+              </a:spcBef>
+              <a:spcAft>
+                <a:spcPts val="0"/>
+              </a:spcAft>
+              <a:buSzPts val="1400"/>
+              <a:buChar char="❏"/>
+            </a:pPr>
+            <a:r>
+              <a:rPr lang="en"/>
+              <a:t>Decision tree</a:t>
+            </a:r>
+            <a:endParaRPr/>
+          </a:p>
+          <a:p>
+            <a:pPr indent="-317500" lvl="0" marL="457200" rtl="0" algn="l">
+              <a:spcBef>
+                <a:spcPts val="0"/>
+              </a:spcBef>
+              <a:spcAft>
+                <a:spcPts val="0"/>
+              </a:spcAft>
+              <a:buSzPts val="1400"/>
+              <a:buChar char="❏"/>
+            </a:pPr>
+            <a:r>
+              <a:rPr lang="en"/>
+              <a:t>Principal</a:t>
+            </a:r>
+            <a:r>
+              <a:rPr lang="en"/>
+              <a:t> Component Analysis</a:t>
+            </a:r>
+            <a:endParaRPr/>
+          </a:p>
+          <a:p>
+            <a:pPr indent="-317500" lvl="0" marL="457200" rtl="0" algn="l">
+              <a:spcBef>
+                <a:spcPts val="0"/>
+              </a:spcBef>
+              <a:spcAft>
+                <a:spcPts val="0"/>
+              </a:spcAft>
+              <a:buSzPts val="1400"/>
+              <a:buChar char="❏"/>
+            </a:pPr>
+            <a:r>
+              <a:rPr lang="en"/>
+              <a:t>Support Vector Machine</a:t>
             </a:r>
             <a:endParaRPr/>
           </a:p>
@@ -26566,7 +26576,7 @@
         </p:nvSpPr>
         <p:spPr>
           <a:xfrm>
-            <a:off x="661900" y="2796825"/>
+            <a:off x="661900" y="840513"/>
             <a:ext cx="427500" cy="400200"/>
           </a:xfrm>
           <a:prstGeom prst="rect">
@@ -26608,7 +26618,7 @@
         </p:nvSpPr>
         <p:spPr>
           <a:xfrm>
-            <a:off x="661900" y="3915450"/>
+            <a:off x="661900" y="2796825"/>
             <a:ext cx="427500" cy="400200"/>
           </a:xfrm>
           <a:prstGeom prst="rect">
@@ -26650,6 +26660,48 @@
         </p:nvSpPr>
         <p:spPr>
           <a:xfrm>
+            <a:off x="661900" y="3915450"/>
+            <a:ext cx="427500" cy="400200"/>
+          </a:xfrm>
+          <a:prstGeom prst="rect">
+            <a:avLst/>
+          </a:prstGeom>
+          <a:noFill/>
+          <a:ln>
+            <a:noFill/>
+          </a:ln>
+        </p:spPr>
+        <p:txBody>
+          <a:bodyPr anchorCtr="0" anchor="t" bIns="91425" lIns="91425" spcFirstLastPara="1" rIns="91425" wrap="square" tIns="91425">
+            <a:spAutoFit/>
+          </a:bodyPr>
+          <a:lstStyle/>
+          <a:p>
+            <a:pPr indent="0" lvl="0" marL="0" rtl="0" algn="l">
+              <a:spcBef>
+                <a:spcPts val="0"/>
+              </a:spcBef>
+              <a:spcAft>
+                <a:spcPts val="0"/>
+              </a:spcAft>
+              <a:buNone/>
+            </a:pPr>
+            <a:r>
+              <a:rPr lang="en"/>
+              <a:t>✔</a:t>
+            </a:r>
+            <a:endParaRPr/>
+          </a:p>
+        </p:txBody>
+      </p:sp>
+      <p:sp>
+        <p:nvSpPr>
+          <p:cNvPr id="441" name="Google Shape;441;p52"/>
+          <p:cNvSpPr txBox="1"/>
+          <p:nvPr/>
+        </p:nvSpPr>
+        <p:spPr>
+          <a:xfrm>
             <a:off x="4572000" y="3961825"/>
             <a:ext cx="3296400" cy="400200"/>
           </a:xfrm>
@@ -26695,7 +26747,7 @@
       </p:sp>
       <p:pic>
         <p:nvPicPr>
-          <p:cNvPr id="441" name="Google Shape;441;p52"/>
+          <p:cNvPr id="442" name="Google Shape;442;p52"/>
           <p:cNvPicPr preferRelativeResize="0"/>
           <p:nvPr/>
         </p:nvPicPr>
@@ -26734,59 +26786,6 @@
             <p:seq concurrent="1" nextAc="seek">
               <p:cTn dur="indefinite" id="2" nodeType="mainSeq">
                 <p:childTnLst>
-                  <p:par>
-                    <p:cTn fill="hold">
-                      <p:stCondLst>
-                        <p:cond delay="indefinite"/>
-                      </p:stCondLst>
-                      <p:childTnLst>
-                        <p:par>
-                          <p:cTn fill="hold">
-                            <p:stCondLst>
-                              <p:cond delay="0"/>
-                            </p:stCondLst>
-                            <p:childTnLst>
-                              <p:par>
-                                <p:cTn fill="hold" nodeType="clickEffect" presetClass="entr" presetID="10" presetSubtype="0">
-                                  <p:stCondLst>
-                                    <p:cond delay="0"/>
-                                  </p:stCondLst>
-                                  <p:childTnLst>
-                                    <p:set>
-                                      <p:cBhvr>
-                                        <p:cTn dur="1" fill="hold">
-                                          <p:stCondLst>
-                                            <p:cond delay="0"/>
-                                          </p:stCondLst>
-                                        </p:cTn>
-                                        <p:tgtEl>
-                                          <p:spTgt spid="437"/>
-                                        </p:tgtEl>
-                                        <p:attrNameLst>
-                                          <p:attrName>style.visibility</p:attrName>
-                                        </p:attrNameLst>
-                                      </p:cBhvr>
-                                      <p:to>
-                                        <p:strVal val="visible"/>
-                                      </p:to>
-                                    </p:set>
-                                    <p:animEffect filter="fade" transition="in">
-                                      <p:cBhvr>
-                                        <p:cTn dur="1000"/>
-                                        <p:tgtEl>
-                                          <p:spTgt spid="437"/>
-                                        </p:tgtEl>
-                                      </p:cBhvr>
-                                    </p:animEffect>
-                                  </p:childTnLst>
-                                </p:cTn>
-                              </p:par>
-                            </p:childTnLst>
-                          </p:cTn>
-                        </p:par>
-                      </p:childTnLst>
-                    </p:cTn>
-                  </p:par>
                   <p:par>
                     <p:cTn fill="hold">
                       <p:stCondLst>
@@ -26893,6 +26892,59 @@
                       </p:childTnLst>
                     </p:cTn>
                   </p:par>
+                  <p:par>
+                    <p:cTn fill="hold">
+                      <p:stCondLst>
+                        <p:cond delay="indefinite"/>
+                      </p:stCondLst>
+                      <p:childTnLst>
+                        <p:par>
+                          <p:cTn fill="hold">
+                            <p:stCondLst>
+                              <p:cond delay="0"/>
+                            </p:stCondLst>
+                            <p:childTnLst>
+                              <p:par>
+                                <p:cTn fill="hold" nodeType="clickEffect" presetClass="entr" presetID="10" presetSubtype="0">
+                                  <p:stCondLst>
+                                    <p:cond delay="0"/>
+                                  </p:stCondLst>
+                                  <p:childTnLst>
+                                    <p:set>
+                                      <p:cBhvr>
+                                        <p:cTn dur="1" fill="hold">
+                                          <p:stCondLst>
+                                            <p:cond delay="0"/>
+                                          </p:stCondLst>
+                                        </p:cTn>
+                                        <p:tgtEl>
+                                          <p:spTgt spid="440"/>
+                                        </p:tgtEl>
+                                        <p:attrNameLst>
+                                          <p:attrName>style.visibility</p:attrName>
+                                        </p:attrNameLst>
+                                      </p:cBhvr>
+                                      <p:to>
+                                        <p:strVal val="visible"/>
+                                      </p:to>
+                                    </p:set>
+                                    <p:animEffect filter="fade" transition="in">
+                                      <p:cBhvr>
+                                        <p:cTn dur="1000"/>
+                                        <p:tgtEl>
+                                          <p:spTgt spid="440"/>
+                                        </p:tgtEl>
+                                      </p:cBhvr>
+                                    </p:animEffect>
+                                  </p:childTnLst>
+                                </p:cTn>
+                              </p:par>
+                            </p:childTnLst>
+                          </p:cTn>
+                        </p:par>
+                      </p:childTnLst>
+                    </p:cTn>
+                  </p:par>
                 </p:childTnLst>
               </p:cTn>
               <p:prevCondLst>
@@ -26923,7 +26975,7 @@
   <p:cSld>
     <p:spTree>
       <p:nvGrpSpPr>
-        <p:cNvPr id="445" name="Shape 445"/>
+        <p:cNvPr id="446" name="Shape 446"/>
         <p:cNvGrpSpPr/>
         <p:nvPr/>
       </p:nvGrpSpPr>
@@ -26937,7 +26989,7 @@
       </p:grpSpPr>
       <p:pic>
         <p:nvPicPr>
-          <p:cNvPr id="446" name="Google Shape;446;p53"/>
+          <p:cNvPr id="447" name="Google Shape;447;p53"/>
           <p:cNvPicPr preferRelativeResize="0"/>
           <p:nvPr/>
         </p:nvPicPr>
@@ -26965,7 +27017,7 @@
       </p:pic>
       <p:sp>
         <p:nvSpPr>
-          <p:cNvPr id="447" name="Google Shape;447;p53"/>
+          <p:cNvPr id="448" name="Google Shape;448;p53"/>
           <p:cNvSpPr txBox="1"/>
           <p:nvPr>
             <p:ph type="title"/>
@@ -27013,7 +27065,7 @@
       </p:sp>
       <p:sp>
         <p:nvSpPr>
-          <p:cNvPr id="448" name="Google Shape;448;p53"/>
+          <p:cNvPr id="449" name="Google Shape;449;p53"/>
           <p:cNvSpPr txBox="1"/>
           <p:nvPr/>
         </p:nvSpPr>
@@ -27127,7 +27179,7 @@
       </p:sp>
       <p:sp>
         <p:nvSpPr>
-          <p:cNvPr id="449" name="Google Shape;449;p53"/>
+          <p:cNvPr id="450" name="Google Shape;450;p53"/>
           <p:cNvSpPr txBox="1"/>
           <p:nvPr>
             <p:ph idx="12" type="sldNum"/>
@@ -27183,7 +27235,7 @@
       </p:sp>
       <p:pic>
         <p:nvPicPr>
-          <p:cNvPr id="450" name="Google Shape;450;p53"/>
+          <p:cNvPr id="451" name="Google Shape;451;p53"/>
           <p:cNvPicPr preferRelativeResize="0"/>
           <p:nvPr/>
         </p:nvPicPr>
@@ -30545,9 +30597,9 @@
 </file>
 
 <file path=ppt/theme/theme1.xml><?xml version="1.0" encoding="utf-8"?>
-<a:theme xmlns:a="http://schemas.openxmlformats.org/drawingml/2006/main" xmlns:r="http://schemas.openxmlformats.org/officeDocument/2006/relationships" name="Simple Light">
+<a:theme xmlns:a="http://schemas.openxmlformats.org/drawingml/2006/main" xmlns:r="http://schemas.openxmlformats.org/officeDocument/2006/relationships">
   <a:themeElements>
-    <a:clrScheme name="Simple Light">
+    <a:clrScheme name="Default">
       <a:dk1>
         <a:srgbClr val="000000"/>
       </a:dk1>
@@ -30555,34 +30607,34 @@
         <a:srgbClr val="FFFFFF"/>
       </a:lt1>
       <a:dk2>
-        <a:srgbClr val="595959"/>
+        <a:srgbClr val="158158"/>
       </a:dk2>
       <a:lt2>
-        <a:srgbClr val="EEEEEE"/>
+        <a:srgbClr val="F3F3F3"/>
       </a:lt2>
       <a:accent1>
-        <a:srgbClr val="4285F4"/>
+        <a:srgbClr val="058DC7"/>
       </a:accent1>
       <a:accent2>
-        <a:srgbClr val="212121"/>
+        <a:srgbClr val="50B432"/>
       </a:accent2>
       <a:accent3>
-        <a:srgbClr val="78909C"/>
+        <a:srgbClr val="ED561B"/>
       </a:accent3>
       <a:accent4>
-        <a:srgbClr val="FFAB40"/>
+        <a:srgbClr val="EDEF00"/>
       </a:accent4>
       <a:accent5>
-        <a:srgbClr val="0097A7"/>
+        <a:srgbClr val="24CBE5"/>
       </a:accent5>
       <a:accent6>
-        <a:srgbClr val="EEFF41"/>
+        <a:srgbClr val="64E572"/>
       </a:accent6>
       <a:hlink>
-        <a:srgbClr val="0097A7"/>
+        <a:srgbClr val="2200CC"/>
       </a:hlink>
       <a:folHlink>
-        <a:srgbClr val="0097A7"/>
+        <a:srgbClr val="551A8B"/>
       </a:folHlink>
     </a:clrScheme>
     <a:fontScheme name="Office">
@@ -31103,9 +31155,9 @@
 </file>
 
 <file path=ppt/theme/theme3.xml><?xml version="1.0" encoding="utf-8"?>
-<a:theme xmlns:a="http://schemas.openxmlformats.org/drawingml/2006/main" xmlns:r="http://schemas.openxmlformats.org/officeDocument/2006/relationships">
+<a:theme xmlns:a="http://schemas.openxmlformats.org/drawingml/2006/main" xmlns:r="http://schemas.openxmlformats.org/officeDocument/2006/relationships" name="Simple Light">
   <a:themeElements>
-    <a:clrScheme name="Default">
+    <a:clrScheme name="Simple Light">
       <a:dk1>
         <a:srgbClr val="000000"/>
       </a:dk1>
@@ -31113,34 +31165,34 @@
         <a:srgbClr val="FFFFFF"/>
       </a:lt1>
       <a:dk2>
-        <a:srgbClr val="158158"/>
+        <a:srgbClr val="595959"/>
       </a:dk2>
       <a:lt2>
-        <a:srgbClr val="F3F3F3"/>
+        <a:srgbClr val="EEEEEE"/>
       </a:lt2>
       <a:accent1>
-        <a:srgbClr val="058DC7"/>
+        <a:srgbClr val="4285F4"/>
       </a:accent1>
       <a:accent2>
-        <a:srgbClr val="50B432"/>
+        <a:srgbClr val="212121"/>
       </a:accent2>
       <a:accent3>
-        <a:srgbClr val="ED561B"/>
+        <a:srgbClr val="78909C"/>
       </a:accent3>
       <a:accent4>
-        <a:srgbClr val="EDEF00"/>
+        <a:srgbClr val="FFAB40"/>
       </a:accent4>
       <a:accent5>
-        <a:srgbClr val="24CBE5"/>
+        <a:srgbClr val="0097A7"/>
       </a:accent5>
       <a:accent6>
-        <a:srgbClr val="64E572"/>
+        <a:srgbClr val="EEFF41"/>
       </a:accent6>
       <a:hlink>
-        <a:srgbClr val="2200CC"/>
+        <a:srgbClr val="0097A7"/>
       </a:hlink>
       <a:folHlink>
-        <a:srgbClr val="551A8B"/>
+        <a:srgbClr val="0097A7"/>
       </a:folHlink>
     </a:clrScheme>
     <a:fontScheme name="Office">

</xml_diff>

<commit_message>
use python wget module instead of system wget command in demo and exercise
</commit_message>
<xml_diff>
--- a/Day_1/Lectures/Day_1_Lecture_1_Introduction_to_Artificial_Intelligence_and_Machine_Learning.pptx
+++ b/Day_1/Lectures/Day_1_Lecture_1_Introduction_to_Artificial_Intelligence_and_Machine_Learning.pptx
@@ -30786,9 +30786,9 @@
 </file>
 
 <file path=ppt/theme/theme1.xml><?xml version="1.0" encoding="utf-8"?>
-<a:theme xmlns:a="http://schemas.openxmlformats.org/drawingml/2006/main" xmlns:r="http://schemas.openxmlformats.org/officeDocument/2006/relationships">
+<a:theme xmlns:a="http://schemas.openxmlformats.org/drawingml/2006/main" xmlns:r="http://schemas.openxmlformats.org/officeDocument/2006/relationships" name="Simple Light">
   <a:themeElements>
-    <a:clrScheme name="Default">
+    <a:clrScheme name="Simple Light">
       <a:dk1>
         <a:srgbClr val="000000"/>
       </a:dk1>
@@ -30796,34 +30796,34 @@
         <a:srgbClr val="FFFFFF"/>
       </a:lt1>
       <a:dk2>
-        <a:srgbClr val="158158"/>
+        <a:srgbClr val="595959"/>
       </a:dk2>
       <a:lt2>
-        <a:srgbClr val="F3F3F3"/>
+        <a:srgbClr val="EEEEEE"/>
       </a:lt2>
       <a:accent1>
-        <a:srgbClr val="058DC7"/>
+        <a:srgbClr val="4285F4"/>
       </a:accent1>
       <a:accent2>
-        <a:srgbClr val="50B432"/>
+        <a:srgbClr val="212121"/>
       </a:accent2>
       <a:accent3>
-        <a:srgbClr val="ED561B"/>
+        <a:srgbClr val="78909C"/>
       </a:accent3>
       <a:accent4>
-        <a:srgbClr val="EDEF00"/>
+        <a:srgbClr val="FFAB40"/>
       </a:accent4>
       <a:accent5>
-        <a:srgbClr val="24CBE5"/>
+        <a:srgbClr val="0097A7"/>
       </a:accent5>
       <a:accent6>
-        <a:srgbClr val="64E572"/>
+        <a:srgbClr val="EEFF41"/>
       </a:accent6>
       <a:hlink>
-        <a:srgbClr val="2200CC"/>
+        <a:srgbClr val="0097A7"/>
       </a:hlink>
       <a:folHlink>
-        <a:srgbClr val="551A8B"/>
+        <a:srgbClr val="0097A7"/>
       </a:folHlink>
     </a:clrScheme>
     <a:fontScheme name="Office">
@@ -31065,9 +31065,9 @@
 </file>
 
 <file path=ppt/theme/theme2.xml><?xml version="1.0" encoding="utf-8"?>
-<a:theme xmlns:a="http://schemas.openxmlformats.org/drawingml/2006/main" xmlns:r="http://schemas.openxmlformats.org/officeDocument/2006/relationships" name="Simple Light">
+<a:theme xmlns:a="http://schemas.openxmlformats.org/drawingml/2006/main" xmlns:r="http://schemas.openxmlformats.org/officeDocument/2006/relationships">
   <a:themeElements>
-    <a:clrScheme name="Simple Light">
+    <a:clrScheme name="Default">
       <a:dk1>
         <a:srgbClr val="000000"/>
       </a:dk1>
@@ -31075,34 +31075,34 @@
         <a:srgbClr val="FFFFFF"/>
       </a:lt1>
       <a:dk2>
-        <a:srgbClr val="595959"/>
+        <a:srgbClr val="158158"/>
       </a:dk2>
       <a:lt2>
-        <a:srgbClr val="EEEEEE"/>
+        <a:srgbClr val="F3F3F3"/>
       </a:lt2>
       <a:accent1>
-        <a:srgbClr val="4285F4"/>
+        <a:srgbClr val="058DC7"/>
       </a:accent1>
       <a:accent2>
-        <a:srgbClr val="212121"/>
+        <a:srgbClr val="50B432"/>
       </a:accent2>
       <a:accent3>
-        <a:srgbClr val="78909C"/>
+        <a:srgbClr val="ED561B"/>
       </a:accent3>
       <a:accent4>
-        <a:srgbClr val="FFAB40"/>
+        <a:srgbClr val="EDEF00"/>
       </a:accent4>
       <a:accent5>
-        <a:srgbClr val="0097A7"/>
+        <a:srgbClr val="24CBE5"/>
       </a:accent5>
       <a:accent6>
-        <a:srgbClr val="EEFF41"/>
+        <a:srgbClr val="64E572"/>
       </a:accent6>
       <a:hlink>
-        <a:srgbClr val="0097A7"/>
+        <a:srgbClr val="2200CC"/>
       </a:hlink>
       <a:folHlink>
-        <a:srgbClr val="0097A7"/>
+        <a:srgbClr val="551A8B"/>
       </a:folHlink>
     </a:clrScheme>
     <a:fontScheme name="Office">

</xml_diff>